<commit_message>
Worked more on the slides and simulation for one day.
</commit_message>
<xml_diff>
--- a/M2/pfriffi1_xiaoxiaj_m2_slides.pptx
+++ b/M2/pfriffi1_xiaoxiaj_m2_slides.pptx
@@ -243,7 +243,7 @@
           <a:p>
             <a:fld id="{21AACA94-EF5F-467D-ACD5-1C03865729BF}" type="datetimeFigureOut">
               <a:rPr lang="en-US" smtClean="0"/>
-              <a:t>11/8/2016</a:t>
+              <a:t>11/9/2016</a:t>
             </a:fld>
             <a:endParaRPr lang="en-US"/>
           </a:p>
@@ -7996,11 +7996,7 @@
             </a:r>
             <a:r>
               <a:rPr lang="en-US" dirty="0" smtClean="0"/>
-              <a:t>iti </a:t>
-            </a:r>
-            <a:r>
-              <a:rPr lang="en-US" dirty="0" smtClean="0"/>
-              <a:t>Bike Network</a:t>
+              <a:t>iti Bike Network</a:t>
             </a:r>
             <a:endParaRPr lang="en-US" dirty="0"/>
           </a:p>
@@ -9455,14 +9451,7 @@
                 <a:latin typeface="Times New Roman" panose="02020603050405020304" pitchFamily="18" charset="0"/>
                 <a:cs typeface="Times New Roman" panose="02020603050405020304" pitchFamily="18" charset="0"/>
               </a:rPr>
-              <a:t>The System: a set of </a:t>
-            </a:r>
-            <a:r>
-              <a:rPr lang="en-US" sz="2000" dirty="0" smtClean="0">
-                <a:latin typeface="Times New Roman" panose="02020603050405020304" pitchFamily="18" charset="0"/>
-                <a:cs typeface="Times New Roman" panose="02020603050405020304" pitchFamily="18" charset="0"/>
-              </a:rPr>
-              <a:t>stations</a:t>
+              <a:t>The System: a set of stations</a:t>
             </a:r>
           </a:p>
           <a:p>
@@ -9534,21 +9523,7 @@
                 <a:latin typeface="Times New Roman" panose="02020603050405020304" pitchFamily="18" charset="0"/>
                 <a:cs typeface="Times New Roman" panose="02020603050405020304" pitchFamily="18" charset="0"/>
               </a:rPr>
-              <a:t>Recommend </a:t>
-            </a:r>
-            <a:r>
-              <a:rPr lang="en-US" sz="1800" dirty="0" smtClean="0">
-                <a:latin typeface="Times New Roman" panose="02020603050405020304" pitchFamily="18" charset="0"/>
-                <a:cs typeface="Times New Roman" panose="02020603050405020304" pitchFamily="18" charset="0"/>
-              </a:rPr>
-              <a:t>sets of candidate </a:t>
-            </a:r>
-            <a:r>
-              <a:rPr lang="en-US" sz="1800" dirty="0" smtClean="0">
-                <a:latin typeface="Times New Roman" panose="02020603050405020304" pitchFamily="18" charset="0"/>
-                <a:cs typeface="Times New Roman" panose="02020603050405020304" pitchFamily="18" charset="0"/>
-              </a:rPr>
-              <a:t>stations for pick-up and drop-off</a:t>
+              <a:t>Recommend sets of candidate stations for pick-up and drop-off</a:t>
             </a:r>
           </a:p>
           <a:p>
@@ -11017,7 +10992,14 @@
                 <a:latin typeface="Times New Roman" panose="02020603050405020304" pitchFamily="18" charset="0"/>
                 <a:cs typeface="Times New Roman" panose="02020603050405020304" pitchFamily="18" charset="0"/>
               </a:rPr>
-              <a:t>solution to </a:t>
+              <a:t>solutions </a:t>
+            </a:r>
+            <a:r>
+              <a:rPr lang="en-US" sz="1800" dirty="0" smtClean="0">
+                <a:latin typeface="Times New Roman" panose="02020603050405020304" pitchFamily="18" charset="0"/>
+                <a:cs typeface="Times New Roman" panose="02020603050405020304" pitchFamily="18" charset="0"/>
+              </a:rPr>
+              <a:t>to </a:t>
             </a:r>
             <a:r>
               <a:rPr lang="en-US" sz="1800" dirty="0">

</xml_diff>